<commit_message>
update logic 04 and 05
</commit_message>
<xml_diff>
--- a/java/java-logic/Slide-Java-Logic-02.pptx
+++ b/java/java-logic/Slide-Java-Logic-02.pptx
@@ -1481,6 +1481,1189 @@
         </p:txBody>
       </p:sp>
     </p:spTree>
+  </p:cSld>
+  <p:clrMapOvr>
+    <a:masterClrMapping/>
+  </p:clrMapOvr>
+</p:sldLayout>
+</file>
+
+<file path=ppt/slideLayouts/slideLayout10.xml><?xml version="1.0" encoding="utf-8"?>
+<p:sldLayout xmlns:a="http://schemas.openxmlformats.org/drawingml/2006/main" xmlns:r="http://schemas.openxmlformats.org/officeDocument/2006/relationships" xmlns:p="http://schemas.openxmlformats.org/presentationml/2006/main" matchingName="Blank" preserve="1" userDrawn="1">
+  <p:cSld name="1_Blank">
+    <p:spTree>
+      <p:nvGrpSpPr>
+        <p:cNvPr id="1" name="Shape 162"/>
+        <p:cNvGrpSpPr/>
+        <p:nvPr/>
+      </p:nvGrpSpPr>
+      <p:grpSpPr>
+        <a:xfrm>
+          <a:off x="0" y="0"/>
+          <a:ext cx="0" cy="0"/>
+          <a:chOff x="0" y="0"/>
+          <a:chExt cx="0" cy="0"/>
+        </a:xfrm>
+      </p:grpSpPr>
+      <p:sp>
+        <p:nvSpPr>
+          <p:cNvPr id="163" name="Google Shape;163;p10"/>
+          <p:cNvSpPr txBox="1">
+            <a:spLocks noGrp="1"/>
+          </p:cNvSpPr>
+          <p:nvPr>
+            <p:ph type="sldNum" idx="12"/>
+          </p:nvPr>
+        </p:nvSpPr>
+        <p:spPr>
+          <a:xfrm>
+            <a:off x="7618000" y="4636500"/>
+            <a:ext cx="1487400" cy="315600"/>
+          </a:xfrm>
+          <a:prstGeom prst="rect">
+            <a:avLst/>
+          </a:prstGeom>
+        </p:spPr>
+        <p:txBody>
+          <a:bodyPr spcFirstLastPara="1" wrap="square" lIns="91425" tIns="91425" rIns="91425" bIns="91425" anchor="ctr" anchorCtr="0">
+            <a:noAutofit/>
+          </a:bodyPr>
+          <a:lstStyle>
+            <a:lvl1pPr lvl="0">
+              <a:buNone/>
+              <a:defRPr/>
+            </a:lvl1pPr>
+            <a:lvl2pPr lvl="1">
+              <a:buNone/>
+              <a:defRPr/>
+            </a:lvl2pPr>
+            <a:lvl3pPr lvl="2">
+              <a:buNone/>
+              <a:defRPr/>
+            </a:lvl3pPr>
+            <a:lvl4pPr lvl="3">
+              <a:buNone/>
+              <a:defRPr/>
+            </a:lvl4pPr>
+            <a:lvl5pPr lvl="4">
+              <a:buNone/>
+              <a:defRPr/>
+            </a:lvl5pPr>
+            <a:lvl6pPr lvl="5">
+              <a:buNone/>
+              <a:defRPr/>
+            </a:lvl6pPr>
+            <a:lvl7pPr lvl="6">
+              <a:buNone/>
+              <a:defRPr/>
+            </a:lvl7pPr>
+            <a:lvl8pPr lvl="7">
+              <a:buNone/>
+              <a:defRPr/>
+            </a:lvl8pPr>
+            <a:lvl9pPr lvl="8">
+              <a:buNone/>
+              <a:defRPr/>
+            </a:lvl9pPr>
+          </a:lstStyle>
+          <a:p>
+            <a:pPr marL="0" lvl="0" indent="0" algn="r" rtl="0">
+              <a:spcBef>
+                <a:spcPts val="0"/>
+              </a:spcBef>
+              <a:spcAft>
+                <a:spcPts val="0"/>
+              </a:spcAft>
+              <a:buNone/>
+            </a:pPr>
+            <a:fld id="{00000000-1234-1234-1234-123412341234}" type="slidenum">
+              <a:rPr lang="en"/>
+              <a:t>‹#›</a:t>
+            </a:fld>
+            <a:endParaRPr/>
+          </a:p>
+        </p:txBody>
+      </p:sp>
+      <p:grpSp>
+        <p:nvGrpSpPr>
+          <p:cNvPr id="164" name="Google Shape;164;p10"/>
+          <p:cNvGrpSpPr/>
+          <p:nvPr/>
+        </p:nvGrpSpPr>
+        <p:grpSpPr>
+          <a:xfrm>
+            <a:off x="6946842" y="4472723"/>
+            <a:ext cx="2202830" cy="670795"/>
+            <a:chOff x="5575242" y="4472723"/>
+            <a:chExt cx="2202830" cy="670795"/>
+          </a:xfrm>
+        </p:grpSpPr>
+        <p:sp>
+          <p:nvSpPr>
+            <p:cNvPr id="165" name="Google Shape;165;p10"/>
+            <p:cNvSpPr/>
+            <p:nvPr/>
+          </p:nvSpPr>
+          <p:spPr>
+            <a:xfrm rot="10800000">
+              <a:off x="5575242" y="4948334"/>
+              <a:ext cx="394200" cy="131400"/>
+            </a:xfrm>
+            <a:prstGeom prst="triangle">
+              <a:avLst>
+                <a:gd name="adj" fmla="val 32425"/>
+              </a:avLst>
+            </a:prstGeom>
+            <a:solidFill>
+              <a:srgbClr val="D26F00"/>
+            </a:solidFill>
+            <a:ln>
+              <a:noFill/>
+            </a:ln>
+          </p:spPr>
+          <p:txBody>
+            <a:bodyPr spcFirstLastPara="1" wrap="square" lIns="91425" tIns="91425" rIns="91425" bIns="91425" anchor="ctr" anchorCtr="0">
+              <a:noAutofit/>
+            </a:bodyPr>
+            <a:lstStyle/>
+            <a:p>
+              <a:pPr marL="0" lvl="0" indent="0" algn="l" rtl="0">
+                <a:spcBef>
+                  <a:spcPts val="0"/>
+                </a:spcBef>
+                <a:spcAft>
+                  <a:spcPts val="0"/>
+                </a:spcAft>
+                <a:buNone/>
+              </a:pPr>
+              <a:endParaRPr/>
+            </a:p>
+          </p:txBody>
+        </p:sp>
+        <p:grpSp>
+          <p:nvGrpSpPr>
+            <p:cNvPr id="166" name="Google Shape;166;p10"/>
+            <p:cNvGrpSpPr/>
+            <p:nvPr/>
+          </p:nvGrpSpPr>
+          <p:grpSpPr>
+            <a:xfrm flipH="1">
+              <a:off x="5734850" y="4472723"/>
+              <a:ext cx="2040837" cy="670795"/>
+              <a:chOff x="1297954" y="330075"/>
+              <a:chExt cx="5169293" cy="1699506"/>
+            </a:xfrm>
+          </p:grpSpPr>
+          <p:sp>
+            <p:nvSpPr>
+              <p:cNvPr id="167" name="Google Shape;167;p10"/>
+              <p:cNvSpPr/>
+              <p:nvPr/>
+            </p:nvSpPr>
+            <p:spPr>
+              <a:xfrm>
+                <a:off x="1297954" y="330081"/>
+                <a:ext cx="3476700" cy="1699500"/>
+              </a:xfrm>
+              <a:prstGeom prst="rect">
+                <a:avLst/>
+              </a:prstGeom>
+              <a:solidFill>
+                <a:srgbClr val="C7D3E6"/>
+              </a:solidFill>
+              <a:ln>
+                <a:noFill/>
+              </a:ln>
+            </p:spPr>
+            <p:txBody>
+              <a:bodyPr spcFirstLastPara="1" wrap="square" lIns="91425" tIns="91425" rIns="91425" bIns="91425" anchor="ctr" anchorCtr="0">
+                <a:noAutofit/>
+              </a:bodyPr>
+              <a:lstStyle/>
+              <a:p>
+                <a:pPr marL="0" lvl="0" indent="0" algn="l" rtl="0">
+                  <a:spcBef>
+                    <a:spcPts val="0"/>
+                  </a:spcBef>
+                  <a:spcAft>
+                    <a:spcPts val="0"/>
+                  </a:spcAft>
+                  <a:buNone/>
+                </a:pPr>
+                <a:endParaRPr/>
+              </a:p>
+            </p:txBody>
+          </p:sp>
+          <p:sp>
+            <p:nvSpPr>
+              <p:cNvPr id="168" name="Google Shape;168;p10"/>
+              <p:cNvSpPr/>
+              <p:nvPr/>
+            </p:nvSpPr>
+            <p:spPr>
+              <a:xfrm>
+                <a:off x="4767747" y="330075"/>
+                <a:ext cx="1699500" cy="1699500"/>
+              </a:xfrm>
+              <a:prstGeom prst="rtTriangle">
+                <a:avLst/>
+              </a:prstGeom>
+              <a:solidFill>
+                <a:srgbClr val="C7D3E6"/>
+              </a:solidFill>
+              <a:ln>
+                <a:noFill/>
+              </a:ln>
+            </p:spPr>
+            <p:txBody>
+              <a:bodyPr spcFirstLastPara="1" wrap="square" lIns="91425" tIns="91425" rIns="91425" bIns="91425" anchor="ctr" anchorCtr="0">
+                <a:noAutofit/>
+              </a:bodyPr>
+              <a:lstStyle/>
+              <a:p>
+                <a:pPr marL="0" lvl="0" indent="0" algn="l" rtl="0">
+                  <a:spcBef>
+                    <a:spcPts val="0"/>
+                  </a:spcBef>
+                  <a:spcAft>
+                    <a:spcPts val="0"/>
+                  </a:spcAft>
+                  <a:buNone/>
+                </a:pPr>
+                <a:endParaRPr/>
+              </a:p>
+            </p:txBody>
+          </p:sp>
+        </p:grpSp>
+        <p:grpSp>
+          <p:nvGrpSpPr>
+            <p:cNvPr id="169" name="Google Shape;169;p10"/>
+            <p:cNvGrpSpPr/>
+            <p:nvPr/>
+          </p:nvGrpSpPr>
+          <p:grpSpPr>
+            <a:xfrm flipH="1">
+              <a:off x="5578209" y="4646738"/>
+              <a:ext cx="2199863" cy="304563"/>
+              <a:chOff x="-5827153" y="330075"/>
+              <a:chExt cx="12276019" cy="1699569"/>
+            </a:xfrm>
+          </p:grpSpPr>
+          <p:sp>
+            <p:nvSpPr>
+              <p:cNvPr id="170" name="Google Shape;170;p10"/>
+              <p:cNvSpPr/>
+              <p:nvPr/>
+            </p:nvSpPr>
+            <p:spPr>
+              <a:xfrm>
+                <a:off x="-5827153" y="330144"/>
+                <a:ext cx="10612200" cy="1699500"/>
+              </a:xfrm>
+              <a:prstGeom prst="rect">
+                <a:avLst/>
+              </a:prstGeom>
+              <a:solidFill>
+                <a:srgbClr val="FF9800"/>
+              </a:solidFill>
+              <a:ln>
+                <a:noFill/>
+              </a:ln>
+            </p:spPr>
+            <p:txBody>
+              <a:bodyPr spcFirstLastPara="1" wrap="square" lIns="91425" tIns="91425" rIns="91425" bIns="91425" anchor="ctr" anchorCtr="0">
+                <a:noAutofit/>
+              </a:bodyPr>
+              <a:lstStyle/>
+              <a:p>
+                <a:pPr marL="0" lvl="0" indent="0" algn="l" rtl="0">
+                  <a:spcBef>
+                    <a:spcPts val="0"/>
+                  </a:spcBef>
+                  <a:spcAft>
+                    <a:spcPts val="0"/>
+                  </a:spcAft>
+                  <a:buNone/>
+                </a:pPr>
+                <a:endParaRPr/>
+              </a:p>
+            </p:txBody>
+          </p:sp>
+          <p:sp>
+            <p:nvSpPr>
+              <p:cNvPr id="171" name="Google Shape;171;p10"/>
+              <p:cNvSpPr/>
+              <p:nvPr/>
+            </p:nvSpPr>
+            <p:spPr>
+              <a:xfrm>
+                <a:off x="4749366" y="330075"/>
+                <a:ext cx="1699500" cy="1699500"/>
+              </a:xfrm>
+              <a:prstGeom prst="rtTriangle">
+                <a:avLst/>
+              </a:prstGeom>
+              <a:solidFill>
+                <a:srgbClr val="FF9800"/>
+              </a:solidFill>
+              <a:ln>
+                <a:noFill/>
+              </a:ln>
+            </p:spPr>
+            <p:txBody>
+              <a:bodyPr spcFirstLastPara="1" wrap="square" lIns="91425" tIns="91425" rIns="91425" bIns="91425" anchor="ctr" anchorCtr="0">
+                <a:noAutofit/>
+              </a:bodyPr>
+              <a:lstStyle/>
+              <a:p>
+                <a:pPr marL="0" lvl="0" indent="0" algn="l" rtl="0">
+                  <a:spcBef>
+                    <a:spcPts val="0"/>
+                  </a:spcBef>
+                  <a:spcAft>
+                    <a:spcPts val="0"/>
+                  </a:spcAft>
+                  <a:buNone/>
+                </a:pPr>
+                <a:endParaRPr/>
+              </a:p>
+            </p:txBody>
+          </p:sp>
+        </p:grpSp>
+      </p:grpSp>
+      <p:sp>
+        <p:nvSpPr>
+          <p:cNvPr id="19" name="Google Shape;79;p5">
+            <a:extLst>
+              <a:ext uri="{FF2B5EF4-FFF2-40B4-BE49-F238E27FC236}">
+                <a16:creationId xmlns:a16="http://schemas.microsoft.com/office/drawing/2014/main" id="{C158645B-7908-4698-B29A-BD4E402A9E17}"/>
+              </a:ext>
+            </a:extLst>
+          </p:cNvPr>
+          <p:cNvSpPr txBox="1">
+            <a:spLocks noGrp="1"/>
+          </p:cNvSpPr>
+          <p:nvPr>
+            <p:ph type="body" idx="1"/>
+          </p:nvPr>
+        </p:nvSpPr>
+        <p:spPr>
+          <a:xfrm>
+            <a:off x="458473" y="1634373"/>
+            <a:ext cx="3950162" cy="3012353"/>
+          </a:xfrm>
+          <a:prstGeom prst="rect">
+            <a:avLst/>
+          </a:prstGeom>
+        </p:spPr>
+        <p:txBody>
+          <a:bodyPr spcFirstLastPara="1" wrap="square" lIns="91425" tIns="91425" rIns="91425" bIns="91425" anchor="t" anchorCtr="0"/>
+          <a:lstStyle>
+            <a:lvl1pPr marL="457200" lvl="0" indent="-381000">
+              <a:spcBef>
+                <a:spcPts val="600"/>
+              </a:spcBef>
+              <a:spcAft>
+                <a:spcPts val="0"/>
+              </a:spcAft>
+              <a:buSzPts val="2400"/>
+              <a:buChar char="▰"/>
+              <a:defRPr sz="1400"/>
+            </a:lvl1pPr>
+            <a:lvl2pPr marL="914400" lvl="1" indent="-381000">
+              <a:spcBef>
+                <a:spcPts val="1000"/>
+              </a:spcBef>
+              <a:spcAft>
+                <a:spcPts val="0"/>
+              </a:spcAft>
+              <a:buSzPts val="2400"/>
+              <a:buChar char="▻"/>
+              <a:defRPr/>
+            </a:lvl2pPr>
+            <a:lvl3pPr marL="1371600" lvl="2" indent="-381000">
+              <a:spcBef>
+                <a:spcPts val="1000"/>
+              </a:spcBef>
+              <a:spcAft>
+                <a:spcPts val="0"/>
+              </a:spcAft>
+              <a:buSzPts val="2400"/>
+              <a:buChar char="▻"/>
+              <a:defRPr/>
+            </a:lvl3pPr>
+            <a:lvl4pPr marL="1828800" lvl="3" indent="-381000">
+              <a:spcBef>
+                <a:spcPts val="1000"/>
+              </a:spcBef>
+              <a:spcAft>
+                <a:spcPts val="0"/>
+              </a:spcAft>
+              <a:buSzPts val="2400"/>
+              <a:buChar char="▻"/>
+              <a:defRPr/>
+            </a:lvl4pPr>
+            <a:lvl5pPr marL="2286000" lvl="4" indent="-381000">
+              <a:spcBef>
+                <a:spcPts val="1000"/>
+              </a:spcBef>
+              <a:spcAft>
+                <a:spcPts val="0"/>
+              </a:spcAft>
+              <a:buSzPts val="2400"/>
+              <a:buChar char="▻"/>
+              <a:defRPr/>
+            </a:lvl5pPr>
+            <a:lvl6pPr marL="2743200" lvl="5" indent="-381000">
+              <a:spcBef>
+                <a:spcPts val="1000"/>
+              </a:spcBef>
+              <a:spcAft>
+                <a:spcPts val="0"/>
+              </a:spcAft>
+              <a:buSzPts val="2400"/>
+              <a:buChar char="▻"/>
+              <a:defRPr/>
+            </a:lvl6pPr>
+            <a:lvl7pPr marL="3200400" lvl="6" indent="-381000">
+              <a:spcBef>
+                <a:spcPts val="1000"/>
+              </a:spcBef>
+              <a:spcAft>
+                <a:spcPts val="0"/>
+              </a:spcAft>
+              <a:buSzPts val="2400"/>
+              <a:buChar char="▻"/>
+              <a:defRPr/>
+            </a:lvl7pPr>
+            <a:lvl8pPr marL="3657600" lvl="7" indent="-381000">
+              <a:spcBef>
+                <a:spcPts val="1000"/>
+              </a:spcBef>
+              <a:spcAft>
+                <a:spcPts val="0"/>
+              </a:spcAft>
+              <a:buSzPts val="2400"/>
+              <a:buChar char="▻"/>
+              <a:defRPr/>
+            </a:lvl8pPr>
+            <a:lvl9pPr marL="4114800" lvl="8" indent="-381000">
+              <a:spcBef>
+                <a:spcPts val="1000"/>
+              </a:spcBef>
+              <a:spcAft>
+                <a:spcPts val="1000"/>
+              </a:spcAft>
+              <a:buSzPts val="2400"/>
+              <a:buChar char="▻"/>
+              <a:defRPr/>
+            </a:lvl9pPr>
+          </a:lstStyle>
+          <a:p>
+            <a:endParaRPr dirty="0"/>
+          </a:p>
+        </p:txBody>
+      </p:sp>
+      <p:sp>
+        <p:nvSpPr>
+          <p:cNvPr id="21" name="Google Shape;79;p5">
+            <a:extLst>
+              <a:ext uri="{FF2B5EF4-FFF2-40B4-BE49-F238E27FC236}">
+                <a16:creationId xmlns:a16="http://schemas.microsoft.com/office/drawing/2014/main" id="{D187CDD8-77CC-44EC-9A35-0FF0C7AAD200}"/>
+              </a:ext>
+            </a:extLst>
+          </p:cNvPr>
+          <p:cNvSpPr txBox="1">
+            <a:spLocks noGrp="1"/>
+          </p:cNvSpPr>
+          <p:nvPr>
+            <p:ph type="body" idx="13"/>
+          </p:nvPr>
+        </p:nvSpPr>
+        <p:spPr>
+          <a:xfrm>
+            <a:off x="4772276" y="1634290"/>
+            <a:ext cx="3913252" cy="3012436"/>
+          </a:xfrm>
+          <a:prstGeom prst="rect">
+            <a:avLst/>
+          </a:prstGeom>
+        </p:spPr>
+        <p:txBody>
+          <a:bodyPr spcFirstLastPara="1" wrap="square" lIns="91425" tIns="91425" rIns="91425" bIns="91425" anchor="t" anchorCtr="0"/>
+          <a:lstStyle>
+            <a:lvl1pPr marL="457200" lvl="0" indent="-381000">
+              <a:spcBef>
+                <a:spcPts val="600"/>
+              </a:spcBef>
+              <a:spcAft>
+                <a:spcPts val="0"/>
+              </a:spcAft>
+              <a:buSzPts val="2400"/>
+              <a:buChar char="▰"/>
+              <a:defRPr sz="1400"/>
+            </a:lvl1pPr>
+            <a:lvl2pPr marL="914400" lvl="1" indent="-381000">
+              <a:spcBef>
+                <a:spcPts val="1000"/>
+              </a:spcBef>
+              <a:spcAft>
+                <a:spcPts val="0"/>
+              </a:spcAft>
+              <a:buSzPts val="2400"/>
+              <a:buChar char="▻"/>
+              <a:defRPr/>
+            </a:lvl2pPr>
+            <a:lvl3pPr marL="1371600" lvl="2" indent="-381000">
+              <a:spcBef>
+                <a:spcPts val="1000"/>
+              </a:spcBef>
+              <a:spcAft>
+                <a:spcPts val="0"/>
+              </a:spcAft>
+              <a:buSzPts val="2400"/>
+              <a:buChar char="▻"/>
+              <a:defRPr/>
+            </a:lvl3pPr>
+            <a:lvl4pPr marL="1828800" lvl="3" indent="-381000">
+              <a:spcBef>
+                <a:spcPts val="1000"/>
+              </a:spcBef>
+              <a:spcAft>
+                <a:spcPts val="0"/>
+              </a:spcAft>
+              <a:buSzPts val="2400"/>
+              <a:buChar char="▻"/>
+              <a:defRPr/>
+            </a:lvl4pPr>
+            <a:lvl5pPr marL="2286000" lvl="4" indent="-381000">
+              <a:spcBef>
+                <a:spcPts val="1000"/>
+              </a:spcBef>
+              <a:spcAft>
+                <a:spcPts val="0"/>
+              </a:spcAft>
+              <a:buSzPts val="2400"/>
+              <a:buChar char="▻"/>
+              <a:defRPr/>
+            </a:lvl5pPr>
+            <a:lvl6pPr marL="2743200" lvl="5" indent="-381000">
+              <a:spcBef>
+                <a:spcPts val="1000"/>
+              </a:spcBef>
+              <a:spcAft>
+                <a:spcPts val="0"/>
+              </a:spcAft>
+              <a:buSzPts val="2400"/>
+              <a:buChar char="▻"/>
+              <a:defRPr/>
+            </a:lvl6pPr>
+            <a:lvl7pPr marL="3200400" lvl="6" indent="-381000">
+              <a:spcBef>
+                <a:spcPts val="1000"/>
+              </a:spcBef>
+              <a:spcAft>
+                <a:spcPts val="0"/>
+              </a:spcAft>
+              <a:buSzPts val="2400"/>
+              <a:buChar char="▻"/>
+              <a:defRPr/>
+            </a:lvl7pPr>
+            <a:lvl8pPr marL="3657600" lvl="7" indent="-381000">
+              <a:spcBef>
+                <a:spcPts val="1000"/>
+              </a:spcBef>
+              <a:spcAft>
+                <a:spcPts val="0"/>
+              </a:spcAft>
+              <a:buSzPts val="2400"/>
+              <a:buChar char="▻"/>
+              <a:defRPr/>
+            </a:lvl8pPr>
+            <a:lvl9pPr marL="4114800" lvl="8" indent="-381000">
+              <a:spcBef>
+                <a:spcPts val="1000"/>
+              </a:spcBef>
+              <a:spcAft>
+                <a:spcPts val="1000"/>
+              </a:spcAft>
+              <a:buSzPts val="2400"/>
+              <a:buChar char="▻"/>
+              <a:defRPr/>
+            </a:lvl9pPr>
+          </a:lstStyle>
+          <a:p>
+            <a:endParaRPr dirty="0"/>
+          </a:p>
+        </p:txBody>
+      </p:sp>
+      <p:grpSp>
+        <p:nvGrpSpPr>
+          <p:cNvPr id="22" name="Google Shape;172;p10">
+            <a:extLst>
+              <a:ext uri="{FF2B5EF4-FFF2-40B4-BE49-F238E27FC236}">
+                <a16:creationId xmlns:a16="http://schemas.microsoft.com/office/drawing/2014/main" id="{75E22C34-0E30-4225-98FF-BF0216DB6D67}"/>
+              </a:ext>
+            </a:extLst>
+          </p:cNvPr>
+          <p:cNvGrpSpPr/>
+          <p:nvPr userDrawn="1"/>
+        </p:nvGrpSpPr>
+        <p:grpSpPr>
+          <a:xfrm rot="10800000">
+            <a:off x="-3288" y="-9"/>
+            <a:ext cx="4583250" cy="600370"/>
+            <a:chOff x="5575242" y="4472728"/>
+            <a:chExt cx="2202830" cy="670794"/>
+          </a:xfrm>
+        </p:grpSpPr>
+        <p:sp>
+          <p:nvSpPr>
+            <p:cNvPr id="23" name="Google Shape;173;p10">
+              <a:extLst>
+                <a:ext uri="{FF2B5EF4-FFF2-40B4-BE49-F238E27FC236}">
+                  <a16:creationId xmlns:a16="http://schemas.microsoft.com/office/drawing/2014/main" id="{57FC667F-3E34-4E20-9053-2A782AC27CF4}"/>
+                </a:ext>
+              </a:extLst>
+            </p:cNvPr>
+            <p:cNvSpPr/>
+            <p:nvPr/>
+          </p:nvSpPr>
+          <p:spPr>
+            <a:xfrm rot="10800000">
+              <a:off x="5575242" y="4948334"/>
+              <a:ext cx="394200" cy="131400"/>
+            </a:xfrm>
+            <a:prstGeom prst="triangle">
+              <a:avLst>
+                <a:gd name="adj" fmla="val 32425"/>
+              </a:avLst>
+            </a:prstGeom>
+            <a:solidFill>
+              <a:srgbClr val="263248"/>
+            </a:solidFill>
+            <a:ln>
+              <a:noFill/>
+            </a:ln>
+          </p:spPr>
+          <p:txBody>
+            <a:bodyPr spcFirstLastPara="1" wrap="square" lIns="91425" tIns="91425" rIns="91425" bIns="91425" anchor="ctr" anchorCtr="0">
+              <a:noAutofit/>
+            </a:bodyPr>
+            <a:lstStyle/>
+            <a:p>
+              <a:pPr marL="0" lvl="0" indent="0" algn="l" rtl="0">
+                <a:spcBef>
+                  <a:spcPts val="0"/>
+                </a:spcBef>
+                <a:spcAft>
+                  <a:spcPts val="0"/>
+                </a:spcAft>
+                <a:buNone/>
+              </a:pPr>
+              <a:endParaRPr/>
+            </a:p>
+          </p:txBody>
+        </p:sp>
+        <p:grpSp>
+          <p:nvGrpSpPr>
+            <p:cNvPr id="24" name="Google Shape;174;p10">
+              <a:extLst>
+                <a:ext uri="{FF2B5EF4-FFF2-40B4-BE49-F238E27FC236}">
+                  <a16:creationId xmlns:a16="http://schemas.microsoft.com/office/drawing/2014/main" id="{0B3BB4D6-0235-4277-8372-B15A47961DEF}"/>
+                </a:ext>
+              </a:extLst>
+            </p:cNvPr>
+            <p:cNvGrpSpPr/>
+            <p:nvPr/>
+          </p:nvGrpSpPr>
+          <p:grpSpPr>
+            <a:xfrm flipH="1">
+              <a:off x="5611893" y="4472728"/>
+              <a:ext cx="2163794" cy="670794"/>
+              <a:chOff x="1297953" y="330090"/>
+              <a:chExt cx="5480735" cy="1699502"/>
+            </a:xfrm>
+          </p:grpSpPr>
+          <p:sp>
+            <p:nvSpPr>
+              <p:cNvPr id="28" name="Google Shape;175;p10">
+                <a:extLst>
+                  <a:ext uri="{FF2B5EF4-FFF2-40B4-BE49-F238E27FC236}">
+                    <a16:creationId xmlns:a16="http://schemas.microsoft.com/office/drawing/2014/main" id="{06E96CE3-389A-41D6-AC88-391C1CD52D3D}"/>
+                  </a:ext>
+                </a:extLst>
+              </p:cNvPr>
+              <p:cNvSpPr/>
+              <p:nvPr/>
+            </p:nvSpPr>
+            <p:spPr>
+              <a:xfrm>
+                <a:off x="1297953" y="330090"/>
+                <a:ext cx="4914520" cy="1699500"/>
+              </a:xfrm>
+              <a:prstGeom prst="rect">
+                <a:avLst/>
+              </a:prstGeom>
+              <a:solidFill>
+                <a:srgbClr val="C7D3E6"/>
+              </a:solidFill>
+              <a:ln>
+                <a:noFill/>
+              </a:ln>
+            </p:spPr>
+            <p:txBody>
+              <a:bodyPr spcFirstLastPara="1" wrap="square" lIns="91425" tIns="91425" rIns="91425" bIns="91425" anchor="ctr" anchorCtr="0">
+                <a:noAutofit/>
+              </a:bodyPr>
+              <a:lstStyle/>
+              <a:p>
+                <a:pPr marL="0" lvl="0" indent="0" algn="l" rtl="0">
+                  <a:spcBef>
+                    <a:spcPts val="0"/>
+                  </a:spcBef>
+                  <a:spcAft>
+                    <a:spcPts val="0"/>
+                  </a:spcAft>
+                  <a:buNone/>
+                </a:pPr>
+                <a:endParaRPr/>
+              </a:p>
+            </p:txBody>
+          </p:sp>
+          <p:sp>
+            <p:nvSpPr>
+              <p:cNvPr id="29" name="Google Shape;176;p10">
+                <a:extLst>
+                  <a:ext uri="{FF2B5EF4-FFF2-40B4-BE49-F238E27FC236}">
+                    <a16:creationId xmlns:a16="http://schemas.microsoft.com/office/drawing/2014/main" id="{EA62C617-AFFE-4BC0-A44D-13FDB3788C2F}"/>
+                  </a:ext>
+                </a:extLst>
+              </p:cNvPr>
+              <p:cNvSpPr/>
+              <p:nvPr/>
+            </p:nvSpPr>
+            <p:spPr>
+              <a:xfrm>
+                <a:off x="6212473" y="330092"/>
+                <a:ext cx="566215" cy="1699500"/>
+              </a:xfrm>
+              <a:prstGeom prst="rtTriangle">
+                <a:avLst/>
+              </a:prstGeom>
+              <a:solidFill>
+                <a:srgbClr val="C7D3E6"/>
+              </a:solidFill>
+              <a:ln>
+                <a:noFill/>
+              </a:ln>
+            </p:spPr>
+            <p:txBody>
+              <a:bodyPr spcFirstLastPara="1" wrap="square" lIns="91425" tIns="91425" rIns="91425" bIns="91425" anchor="ctr" anchorCtr="0">
+                <a:noAutofit/>
+              </a:bodyPr>
+              <a:lstStyle/>
+              <a:p>
+                <a:pPr marL="0" lvl="0" indent="0" algn="l" rtl="0">
+                  <a:spcBef>
+                    <a:spcPts val="0"/>
+                  </a:spcBef>
+                  <a:spcAft>
+                    <a:spcPts val="0"/>
+                  </a:spcAft>
+                  <a:buNone/>
+                </a:pPr>
+                <a:endParaRPr/>
+              </a:p>
+            </p:txBody>
+          </p:sp>
+        </p:grpSp>
+        <p:grpSp>
+          <p:nvGrpSpPr>
+            <p:cNvPr id="25" name="Google Shape;177;p10">
+              <a:extLst>
+                <a:ext uri="{FF2B5EF4-FFF2-40B4-BE49-F238E27FC236}">
+                  <a16:creationId xmlns:a16="http://schemas.microsoft.com/office/drawing/2014/main" id="{7421F6D4-41AD-4407-81E9-BF4842CD211D}"/>
+                </a:ext>
+              </a:extLst>
+            </p:cNvPr>
+            <p:cNvGrpSpPr/>
+            <p:nvPr/>
+          </p:nvGrpSpPr>
+          <p:grpSpPr>
+            <a:xfrm flipH="1">
+              <a:off x="5578209" y="4646738"/>
+              <a:ext cx="2199863" cy="304566"/>
+              <a:chOff x="-5827153" y="330075"/>
+              <a:chExt cx="12276021" cy="1699582"/>
+            </a:xfrm>
+          </p:grpSpPr>
+          <p:sp>
+            <p:nvSpPr>
+              <p:cNvPr id="26" name="Google Shape;178;p10">
+                <a:extLst>
+                  <a:ext uri="{FF2B5EF4-FFF2-40B4-BE49-F238E27FC236}">
+                    <a16:creationId xmlns:a16="http://schemas.microsoft.com/office/drawing/2014/main" id="{0A43C0A8-788C-463B-895F-03E9B8220BBB}"/>
+                  </a:ext>
+                </a:extLst>
+              </p:cNvPr>
+              <p:cNvSpPr/>
+              <p:nvPr/>
+            </p:nvSpPr>
+            <p:spPr>
+              <a:xfrm>
+                <a:off x="-5827153" y="330157"/>
+                <a:ext cx="11641543" cy="1699500"/>
+              </a:xfrm>
+              <a:prstGeom prst="rect">
+                <a:avLst/>
+              </a:prstGeom>
+              <a:solidFill>
+                <a:srgbClr val="3F5378"/>
+              </a:solidFill>
+              <a:ln>
+                <a:noFill/>
+              </a:ln>
+            </p:spPr>
+            <p:txBody>
+              <a:bodyPr spcFirstLastPara="1" wrap="square" lIns="91425" tIns="91425" rIns="91425" bIns="91425" anchor="ctr" anchorCtr="0">
+                <a:noAutofit/>
+              </a:bodyPr>
+              <a:lstStyle/>
+              <a:p>
+                <a:pPr marL="0" lvl="0" indent="0" algn="l" rtl="0">
+                  <a:spcBef>
+                    <a:spcPts val="0"/>
+                  </a:spcBef>
+                  <a:spcAft>
+                    <a:spcPts val="0"/>
+                  </a:spcAft>
+                  <a:buNone/>
+                </a:pPr>
+                <a:endParaRPr/>
+              </a:p>
+            </p:txBody>
+          </p:sp>
+          <p:sp>
+            <p:nvSpPr>
+              <p:cNvPr id="27" name="Google Shape;179;p10">
+                <a:extLst>
+                  <a:ext uri="{FF2B5EF4-FFF2-40B4-BE49-F238E27FC236}">
+                    <a16:creationId xmlns:a16="http://schemas.microsoft.com/office/drawing/2014/main" id="{BAA01DF9-A09B-4CB1-A537-763DC96795F8}"/>
+                  </a:ext>
+                </a:extLst>
+              </p:cNvPr>
+              <p:cNvSpPr/>
+              <p:nvPr/>
+            </p:nvSpPr>
+            <p:spPr>
+              <a:xfrm>
+                <a:off x="5814393" y="330075"/>
+                <a:ext cx="634475" cy="1699500"/>
+              </a:xfrm>
+              <a:prstGeom prst="rtTriangle">
+                <a:avLst/>
+              </a:prstGeom>
+              <a:solidFill>
+                <a:srgbClr val="3F5378"/>
+              </a:solidFill>
+              <a:ln>
+                <a:noFill/>
+              </a:ln>
+            </p:spPr>
+            <p:txBody>
+              <a:bodyPr spcFirstLastPara="1" wrap="square" lIns="91425" tIns="91425" rIns="91425" bIns="91425" anchor="ctr" anchorCtr="0">
+                <a:noAutofit/>
+              </a:bodyPr>
+              <a:lstStyle/>
+              <a:p>
+                <a:pPr marL="0" lvl="0" indent="0" algn="l" rtl="0">
+                  <a:spcBef>
+                    <a:spcPts val="0"/>
+                  </a:spcBef>
+                  <a:spcAft>
+                    <a:spcPts val="0"/>
+                  </a:spcAft>
+                  <a:buNone/>
+                </a:pPr>
+                <a:endParaRPr/>
+              </a:p>
+            </p:txBody>
+          </p:sp>
+        </p:grpSp>
+      </p:grpSp>
+      <p:sp>
+        <p:nvSpPr>
+          <p:cNvPr id="30" name="Google Shape;98;p6">
+            <a:extLst>
+              <a:ext uri="{FF2B5EF4-FFF2-40B4-BE49-F238E27FC236}">
+                <a16:creationId xmlns:a16="http://schemas.microsoft.com/office/drawing/2014/main" id="{98711A4E-00A1-4E89-8063-A15D993ECFCD}"/>
+              </a:ext>
+            </a:extLst>
+          </p:cNvPr>
+          <p:cNvSpPr txBox="1">
+            <a:spLocks noGrp="1"/>
+          </p:cNvSpPr>
+          <p:nvPr>
+            <p:ph type="title"/>
+          </p:nvPr>
+        </p:nvSpPr>
+        <p:spPr>
+          <a:xfrm>
+            <a:off x="458472" y="186451"/>
+            <a:ext cx="3883716" cy="258157"/>
+          </a:xfrm>
+          <a:prstGeom prst="rect">
+            <a:avLst/>
+          </a:prstGeom>
+        </p:spPr>
+        <p:txBody>
+          <a:bodyPr spcFirstLastPara="1" wrap="square" lIns="91425" tIns="91425" rIns="91425" bIns="91425" anchor="ctr" anchorCtr="0"/>
+          <a:lstStyle>
+            <a:lvl1pPr lvl="0">
+              <a:spcBef>
+                <a:spcPts val="0"/>
+              </a:spcBef>
+              <a:spcAft>
+                <a:spcPts val="0"/>
+              </a:spcAft>
+              <a:buSzPts val="2000"/>
+              <a:buNone/>
+              <a:defRPr sz="1600"/>
+            </a:lvl1pPr>
+            <a:lvl2pPr lvl="1">
+              <a:spcBef>
+                <a:spcPts val="0"/>
+              </a:spcBef>
+              <a:spcAft>
+                <a:spcPts val="0"/>
+              </a:spcAft>
+              <a:buSzPts val="2000"/>
+              <a:buNone/>
+              <a:defRPr/>
+            </a:lvl2pPr>
+            <a:lvl3pPr lvl="2">
+              <a:spcBef>
+                <a:spcPts val="0"/>
+              </a:spcBef>
+              <a:spcAft>
+                <a:spcPts val="0"/>
+              </a:spcAft>
+              <a:buSzPts val="2000"/>
+              <a:buNone/>
+              <a:defRPr/>
+            </a:lvl3pPr>
+            <a:lvl4pPr lvl="3">
+              <a:spcBef>
+                <a:spcPts val="0"/>
+              </a:spcBef>
+              <a:spcAft>
+                <a:spcPts val="0"/>
+              </a:spcAft>
+              <a:buSzPts val="2000"/>
+              <a:buNone/>
+              <a:defRPr/>
+            </a:lvl4pPr>
+            <a:lvl5pPr lvl="4">
+              <a:spcBef>
+                <a:spcPts val="0"/>
+              </a:spcBef>
+              <a:spcAft>
+                <a:spcPts val="0"/>
+              </a:spcAft>
+              <a:buSzPts val="2000"/>
+              <a:buNone/>
+              <a:defRPr/>
+            </a:lvl5pPr>
+            <a:lvl6pPr lvl="5">
+              <a:spcBef>
+                <a:spcPts val="0"/>
+              </a:spcBef>
+              <a:spcAft>
+                <a:spcPts val="0"/>
+              </a:spcAft>
+              <a:buSzPts val="2000"/>
+              <a:buNone/>
+              <a:defRPr/>
+            </a:lvl6pPr>
+            <a:lvl7pPr lvl="6">
+              <a:spcBef>
+                <a:spcPts val="0"/>
+              </a:spcBef>
+              <a:spcAft>
+                <a:spcPts val="0"/>
+              </a:spcAft>
+              <a:buSzPts val="2000"/>
+              <a:buNone/>
+              <a:defRPr/>
+            </a:lvl7pPr>
+            <a:lvl8pPr lvl="7">
+              <a:spcBef>
+                <a:spcPts val="0"/>
+              </a:spcBef>
+              <a:spcAft>
+                <a:spcPts val="0"/>
+              </a:spcAft>
+              <a:buSzPts val="2000"/>
+              <a:buNone/>
+              <a:defRPr/>
+            </a:lvl8pPr>
+            <a:lvl9pPr lvl="8">
+              <a:spcBef>
+                <a:spcPts val="0"/>
+              </a:spcBef>
+              <a:spcAft>
+                <a:spcPts val="0"/>
+              </a:spcAft>
+              <a:buSzPts val="2000"/>
+              <a:buNone/>
+              <a:defRPr/>
+            </a:lvl9pPr>
+          </a:lstStyle>
+          <a:p>
+            <a:endParaRPr dirty="0"/>
+          </a:p>
+        </p:txBody>
+      </p:sp>
+      <p:sp>
+        <p:nvSpPr>
+          <p:cNvPr id="31" name="Google Shape;79;p5">
+            <a:extLst>
+              <a:ext uri="{FF2B5EF4-FFF2-40B4-BE49-F238E27FC236}">
+                <a16:creationId xmlns:a16="http://schemas.microsoft.com/office/drawing/2014/main" id="{7408B06A-A607-416C-8836-2D7C1A9516C1}"/>
+              </a:ext>
+            </a:extLst>
+          </p:cNvPr>
+          <p:cNvSpPr txBox="1">
+            <a:spLocks noGrp="1"/>
+          </p:cNvSpPr>
+          <p:nvPr>
+            <p:ph type="body" idx="14"/>
+          </p:nvPr>
+        </p:nvSpPr>
+        <p:spPr>
+          <a:xfrm>
+            <a:off x="461244" y="618719"/>
+            <a:ext cx="8224284" cy="841556"/>
+          </a:xfrm>
+          <a:prstGeom prst="rect">
+            <a:avLst/>
+          </a:prstGeom>
+        </p:spPr>
+        <p:txBody>
+          <a:bodyPr spcFirstLastPara="1" wrap="square" lIns="91425" tIns="91425" rIns="91425" bIns="91425" anchor="t" anchorCtr="0"/>
+          <a:lstStyle>
+            <a:lvl1pPr marL="457200" lvl="0" indent="-381000">
+              <a:spcBef>
+                <a:spcPts val="600"/>
+              </a:spcBef>
+              <a:spcAft>
+                <a:spcPts val="0"/>
+              </a:spcAft>
+              <a:buSzPts val="2400"/>
+              <a:buChar char="▰"/>
+              <a:defRPr sz="1400"/>
+            </a:lvl1pPr>
+            <a:lvl2pPr marL="914400" lvl="1" indent="-381000">
+              <a:spcBef>
+                <a:spcPts val="1000"/>
+              </a:spcBef>
+              <a:spcAft>
+                <a:spcPts val="0"/>
+              </a:spcAft>
+              <a:buSzPts val="2400"/>
+              <a:buChar char="▻"/>
+              <a:defRPr/>
+            </a:lvl2pPr>
+            <a:lvl3pPr marL="1371600" lvl="2" indent="-381000">
+              <a:spcBef>
+                <a:spcPts val="1000"/>
+              </a:spcBef>
+              <a:spcAft>
+                <a:spcPts val="0"/>
+              </a:spcAft>
+              <a:buSzPts val="2400"/>
+              <a:buChar char="▻"/>
+              <a:defRPr/>
+            </a:lvl3pPr>
+            <a:lvl4pPr marL="1828800" lvl="3" indent="-381000">
+              <a:spcBef>
+                <a:spcPts val="1000"/>
+              </a:spcBef>
+              <a:spcAft>
+                <a:spcPts val="0"/>
+              </a:spcAft>
+              <a:buSzPts val="2400"/>
+              <a:buChar char="▻"/>
+              <a:defRPr/>
+            </a:lvl4pPr>
+            <a:lvl5pPr marL="2286000" lvl="4" indent="-381000">
+              <a:spcBef>
+                <a:spcPts val="1000"/>
+              </a:spcBef>
+              <a:spcAft>
+                <a:spcPts val="0"/>
+              </a:spcAft>
+              <a:buSzPts val="2400"/>
+              <a:buChar char="▻"/>
+              <a:defRPr/>
+            </a:lvl5pPr>
+            <a:lvl6pPr marL="2743200" lvl="5" indent="-381000">
+              <a:spcBef>
+                <a:spcPts val="1000"/>
+              </a:spcBef>
+              <a:spcAft>
+                <a:spcPts val="0"/>
+              </a:spcAft>
+              <a:buSzPts val="2400"/>
+              <a:buChar char="▻"/>
+              <a:defRPr/>
+            </a:lvl6pPr>
+            <a:lvl7pPr marL="3200400" lvl="6" indent="-381000">
+              <a:spcBef>
+                <a:spcPts val="1000"/>
+              </a:spcBef>
+              <a:spcAft>
+                <a:spcPts val="0"/>
+              </a:spcAft>
+              <a:buSzPts val="2400"/>
+              <a:buChar char="▻"/>
+              <a:defRPr/>
+            </a:lvl7pPr>
+            <a:lvl8pPr marL="3657600" lvl="7" indent="-381000">
+              <a:spcBef>
+                <a:spcPts val="1000"/>
+              </a:spcBef>
+              <a:spcAft>
+                <a:spcPts val="0"/>
+              </a:spcAft>
+              <a:buSzPts val="2400"/>
+              <a:buChar char="▻"/>
+              <a:defRPr/>
+            </a:lvl8pPr>
+            <a:lvl9pPr marL="4114800" lvl="8" indent="-381000">
+              <a:spcBef>
+                <a:spcPts val="1000"/>
+              </a:spcBef>
+              <a:spcAft>
+                <a:spcPts val="1000"/>
+              </a:spcAft>
+              <a:buSzPts val="2400"/>
+              <a:buChar char="▻"/>
+              <a:defRPr/>
+            </a:lvl9pPr>
+          </a:lstStyle>
+          <a:p>
+            <a:endParaRPr dirty="0"/>
+          </a:p>
+        </p:txBody>
+      </p:sp>
+    </p:spTree>
+    <p:extLst>
+      <p:ext uri="{BB962C8B-B14F-4D97-AF65-F5344CB8AC3E}">
+        <p14:creationId xmlns:p14="http://schemas.microsoft.com/office/powerpoint/2010/main" val="448274850"/>
+      </p:ext>
+    </p:extLst>
   </p:cSld>
   <p:clrMapOvr>
     <a:masterClrMapping/>
@@ -8193,141 +9376,8 @@
         </p:nvSpPr>
         <p:spPr>
           <a:xfrm>
-            <a:off x="458473" y="1634373"/>
-            <a:ext cx="3950162" cy="3012353"/>
-          </a:xfrm>
-          <a:prstGeom prst="rect">
-            <a:avLst/>
-          </a:prstGeom>
-        </p:spPr>
-        <p:txBody>
-          <a:bodyPr spcFirstLastPara="1" wrap="square" lIns="91425" tIns="91425" rIns="91425" bIns="91425" anchor="t" anchorCtr="0"/>
-          <a:lstStyle>
-            <a:lvl1pPr marL="457200" lvl="0" indent="-381000">
-              <a:spcBef>
-                <a:spcPts val="600"/>
-              </a:spcBef>
-              <a:spcAft>
-                <a:spcPts val="0"/>
-              </a:spcAft>
-              <a:buSzPts val="2400"/>
-              <a:buChar char="▰"/>
-              <a:defRPr sz="1400"/>
-            </a:lvl1pPr>
-            <a:lvl2pPr marL="914400" lvl="1" indent="-381000">
-              <a:spcBef>
-                <a:spcPts val="1000"/>
-              </a:spcBef>
-              <a:spcAft>
-                <a:spcPts val="0"/>
-              </a:spcAft>
-              <a:buSzPts val="2400"/>
-              <a:buChar char="▻"/>
-              <a:defRPr/>
-            </a:lvl2pPr>
-            <a:lvl3pPr marL="1371600" lvl="2" indent="-381000">
-              <a:spcBef>
-                <a:spcPts val="1000"/>
-              </a:spcBef>
-              <a:spcAft>
-                <a:spcPts val="0"/>
-              </a:spcAft>
-              <a:buSzPts val="2400"/>
-              <a:buChar char="▻"/>
-              <a:defRPr/>
-            </a:lvl3pPr>
-            <a:lvl4pPr marL="1828800" lvl="3" indent="-381000">
-              <a:spcBef>
-                <a:spcPts val="1000"/>
-              </a:spcBef>
-              <a:spcAft>
-                <a:spcPts val="0"/>
-              </a:spcAft>
-              <a:buSzPts val="2400"/>
-              <a:buChar char="▻"/>
-              <a:defRPr/>
-            </a:lvl4pPr>
-            <a:lvl5pPr marL="2286000" lvl="4" indent="-381000">
-              <a:spcBef>
-                <a:spcPts val="1000"/>
-              </a:spcBef>
-              <a:spcAft>
-                <a:spcPts val="0"/>
-              </a:spcAft>
-              <a:buSzPts val="2400"/>
-              <a:buChar char="▻"/>
-              <a:defRPr/>
-            </a:lvl5pPr>
-            <a:lvl6pPr marL="2743200" lvl="5" indent="-381000">
-              <a:spcBef>
-                <a:spcPts val="1000"/>
-              </a:spcBef>
-              <a:spcAft>
-                <a:spcPts val="0"/>
-              </a:spcAft>
-              <a:buSzPts val="2400"/>
-              <a:buChar char="▻"/>
-              <a:defRPr/>
-            </a:lvl6pPr>
-            <a:lvl7pPr marL="3200400" lvl="6" indent="-381000">
-              <a:spcBef>
-                <a:spcPts val="1000"/>
-              </a:spcBef>
-              <a:spcAft>
-                <a:spcPts val="0"/>
-              </a:spcAft>
-              <a:buSzPts val="2400"/>
-              <a:buChar char="▻"/>
-              <a:defRPr/>
-            </a:lvl7pPr>
-            <a:lvl8pPr marL="3657600" lvl="7" indent="-381000">
-              <a:spcBef>
-                <a:spcPts val="1000"/>
-              </a:spcBef>
-              <a:spcAft>
-                <a:spcPts val="0"/>
-              </a:spcAft>
-              <a:buSzPts val="2400"/>
-              <a:buChar char="▻"/>
-              <a:defRPr/>
-            </a:lvl8pPr>
-            <a:lvl9pPr marL="4114800" lvl="8" indent="-381000">
-              <a:spcBef>
-                <a:spcPts val="1000"/>
-              </a:spcBef>
-              <a:spcAft>
-                <a:spcPts val="1000"/>
-              </a:spcAft>
-              <a:buSzPts val="2400"/>
-              <a:buChar char="▻"/>
-              <a:defRPr/>
-            </a:lvl9pPr>
-          </a:lstStyle>
-          <a:p>
-            <a:endParaRPr dirty="0"/>
-          </a:p>
-        </p:txBody>
-      </p:sp>
-      <p:sp>
-        <p:nvSpPr>
-          <p:cNvPr id="21" name="Google Shape;79;p5">
-            <a:extLst>
-              <a:ext uri="{FF2B5EF4-FFF2-40B4-BE49-F238E27FC236}">
-                <a16:creationId xmlns:a16="http://schemas.microsoft.com/office/drawing/2014/main" id="{D187CDD8-77CC-44EC-9A35-0FF0C7AAD200}"/>
-              </a:ext>
-            </a:extLst>
-          </p:cNvPr>
-          <p:cNvSpPr txBox="1">
-            <a:spLocks noGrp="1"/>
-          </p:cNvSpPr>
-          <p:nvPr>
-            <p:ph type="body" idx="13"/>
-          </p:nvPr>
-        </p:nvSpPr>
-        <p:spPr>
-          <a:xfrm>
-            <a:off x="4772276" y="1634290"/>
-            <a:ext cx="3913252" cy="3012436"/>
+            <a:off x="458472" y="600361"/>
+            <a:ext cx="4799327" cy="4046365"/>
           </a:xfrm>
           <a:prstGeom prst="rect">
             <a:avLst/>
@@ -8869,149 +9919,32 @@
           </a:p>
         </p:txBody>
       </p:sp>
-      <p:sp>
-        <p:nvSpPr>
-          <p:cNvPr id="31" name="Google Shape;79;p5">
-            <a:extLst>
-              <a:ext uri="{FF2B5EF4-FFF2-40B4-BE49-F238E27FC236}">
-                <a16:creationId xmlns:a16="http://schemas.microsoft.com/office/drawing/2014/main" id="{7408B06A-A607-416C-8836-2D7C1A9516C1}"/>
-              </a:ext>
-            </a:extLst>
-          </p:cNvPr>
-          <p:cNvSpPr txBox="1">
-            <a:spLocks noGrp="1"/>
-          </p:cNvSpPr>
-          <p:nvPr>
-            <p:ph type="body" idx="14"/>
-          </p:nvPr>
-        </p:nvSpPr>
-        <p:spPr>
-          <a:xfrm>
-            <a:off x="461244" y="618719"/>
-            <a:ext cx="8224284" cy="841556"/>
-          </a:xfrm>
-          <a:prstGeom prst="rect">
-            <a:avLst/>
-          </a:prstGeom>
-        </p:spPr>
-        <p:txBody>
-          <a:bodyPr spcFirstLastPara="1" wrap="square" lIns="91425" tIns="91425" rIns="91425" bIns="91425" anchor="t" anchorCtr="0"/>
-          <a:lstStyle>
-            <a:lvl1pPr marL="457200" lvl="0" indent="-381000">
-              <a:spcBef>
-                <a:spcPts val="600"/>
-              </a:spcBef>
-              <a:spcAft>
-                <a:spcPts val="0"/>
-              </a:spcAft>
-              <a:buSzPts val="2400"/>
-              <a:buChar char="▰"/>
-              <a:defRPr sz="1400"/>
-            </a:lvl1pPr>
-            <a:lvl2pPr marL="914400" lvl="1" indent="-381000">
-              <a:spcBef>
-                <a:spcPts val="1000"/>
-              </a:spcBef>
-              <a:spcAft>
-                <a:spcPts val="0"/>
-              </a:spcAft>
-              <a:buSzPts val="2400"/>
-              <a:buChar char="▻"/>
-              <a:defRPr/>
-            </a:lvl2pPr>
-            <a:lvl3pPr marL="1371600" lvl="2" indent="-381000">
-              <a:spcBef>
-                <a:spcPts val="1000"/>
-              </a:spcBef>
-              <a:spcAft>
-                <a:spcPts val="0"/>
-              </a:spcAft>
-              <a:buSzPts val="2400"/>
-              <a:buChar char="▻"/>
-              <a:defRPr/>
-            </a:lvl3pPr>
-            <a:lvl4pPr marL="1828800" lvl="3" indent="-381000">
-              <a:spcBef>
-                <a:spcPts val="1000"/>
-              </a:spcBef>
-              <a:spcAft>
-                <a:spcPts val="0"/>
-              </a:spcAft>
-              <a:buSzPts val="2400"/>
-              <a:buChar char="▻"/>
-              <a:defRPr/>
-            </a:lvl4pPr>
-            <a:lvl5pPr marL="2286000" lvl="4" indent="-381000">
-              <a:spcBef>
-                <a:spcPts val="1000"/>
-              </a:spcBef>
-              <a:spcAft>
-                <a:spcPts val="0"/>
-              </a:spcAft>
-              <a:buSzPts val="2400"/>
-              <a:buChar char="▻"/>
-              <a:defRPr/>
-            </a:lvl5pPr>
-            <a:lvl6pPr marL="2743200" lvl="5" indent="-381000">
-              <a:spcBef>
-                <a:spcPts val="1000"/>
-              </a:spcBef>
-              <a:spcAft>
-                <a:spcPts val="0"/>
-              </a:spcAft>
-              <a:buSzPts val="2400"/>
-              <a:buChar char="▻"/>
-              <a:defRPr/>
-            </a:lvl6pPr>
-            <a:lvl7pPr marL="3200400" lvl="6" indent="-381000">
-              <a:spcBef>
-                <a:spcPts val="1000"/>
-              </a:spcBef>
-              <a:spcAft>
-                <a:spcPts val="0"/>
-              </a:spcAft>
-              <a:buSzPts val="2400"/>
-              <a:buChar char="▻"/>
-              <a:defRPr/>
-            </a:lvl7pPr>
-            <a:lvl8pPr marL="3657600" lvl="7" indent="-381000">
-              <a:spcBef>
-                <a:spcPts val="1000"/>
-              </a:spcBef>
-              <a:spcAft>
-                <a:spcPts val="0"/>
-              </a:spcAft>
-              <a:buSzPts val="2400"/>
-              <a:buChar char="▻"/>
-              <a:defRPr/>
-            </a:lvl8pPr>
-            <a:lvl9pPr marL="4114800" lvl="8" indent="-381000">
-              <a:spcBef>
-                <a:spcPts val="1000"/>
-              </a:spcBef>
-              <a:spcAft>
-                <a:spcPts val="1000"/>
-              </a:spcAft>
-              <a:buSzPts val="2400"/>
-              <a:buChar char="▻"/>
-              <a:defRPr/>
-            </a:lvl9pPr>
-          </a:lstStyle>
-          <a:p>
-            <a:endParaRPr dirty="0"/>
-          </a:p>
-        </p:txBody>
-      </p:sp>
     </p:spTree>
     <p:extLst>
       <p:ext uri="{BB962C8B-B14F-4D97-AF65-F5344CB8AC3E}">
-        <p14:creationId xmlns:p14="http://schemas.microsoft.com/office/powerpoint/2010/main" val="448274850"/>
+        <p14:creationId xmlns:p14="http://schemas.microsoft.com/office/powerpoint/2010/main" val="3732096186"/>
       </p:ext>
     </p:extLst>
   </p:cSld>
   <p:clrMapOvr>
     <a:masterClrMapping/>
   </p:clrMapOvr>
+  <p:extLst mod="1">
+    <p:ext uri="{DCECCB84-F9BA-43D5-87BE-67443E8EF086}">
+      <p15:sldGuideLst xmlns:p15="http://schemas.microsoft.com/office/powerpoint/2012/main">
+        <p15:guide id="1" orient="horz" pos="1620">
+          <p15:clr>
+            <a:srgbClr val="FBAE40"/>
+          </p15:clr>
+        </p15:guide>
+        <p15:guide id="2" pos="2880">
+          <p15:clr>
+            <a:srgbClr val="FBAE40"/>
+          </p15:clr>
+        </p15:guide>
+      </p15:sldGuideLst>
+    </p:ext>
+  </p:extLst>
 </p:sldLayout>
 </file>
 
@@ -9685,7 +10618,8 @@
     <p:sldLayoutId id="2147483659" r:id="rId6"/>
     <p:sldLayoutId id="2147483660" r:id="rId7"/>
     <p:sldLayoutId id="2147483663" r:id="rId8"/>
-    <p:sldLayoutId id="2147483661" r:id="rId9"/>
+    <p:sldLayoutId id="2147483664" r:id="rId9"/>
+    <p:sldLayoutId id="2147483661" r:id="rId10"/>
   </p:sldLayoutIdLst>
   <p:transition>
     <p:fade thruBlk="1"/>
@@ -15853,31 +16787,6 @@
           </a:p>
         </p:txBody>
       </p:sp>
-      <p:sp>
-        <p:nvSpPr>
-          <p:cNvPr id="5" name="Text Placeholder 4">
-            <a:extLst>
-              <a:ext uri="{FF2B5EF4-FFF2-40B4-BE49-F238E27FC236}">
-                <a16:creationId xmlns:a16="http://schemas.microsoft.com/office/drawing/2014/main" id="{ACDE1BD3-5AC6-445C-9EB1-DECA48D5010A}"/>
-              </a:ext>
-            </a:extLst>
-          </p:cNvPr>
-          <p:cNvSpPr>
-            <a:spLocks noGrp="1"/>
-          </p:cNvSpPr>
-          <p:nvPr>
-            <p:ph type="body" idx="13"/>
-          </p:nvPr>
-        </p:nvSpPr>
-        <p:spPr/>
-        <p:txBody>
-          <a:bodyPr/>
-          <a:lstStyle/>
-          <a:p>
-            <a:endParaRPr lang="en-ID"/>
-          </a:p>
-        </p:txBody>
-      </p:sp>
       <p:pic>
         <p:nvPicPr>
           <p:cNvPr id="6" name="Picture 5">

</xml_diff>